<commit_message>
update on R script
</commit_message>
<xml_diff>
--- a/Introduction-to-R-dataAnalysis.pptx
+++ b/Introduction-to-R-dataAnalysis.pptx
@@ -9824,6 +9824,55 @@
               <a:t>. " O'Reilly Media, Inc.".</a:t>
             </a:r>
           </a:p>
+          <a:p>
+            <a:pPr>
+              <a:lnSpc>
+                <a:spcPct val="100000"/>
+              </a:lnSpc>
+              <a:spcBef>
+                <a:spcPts val="600"/>
+              </a:spcBef>
+              <a:spcAft>
+                <a:spcPts val="1200"/>
+              </a:spcAft>
+            </a:pPr>
+            <a:endParaRPr lang="en-GB" dirty="0"/>
+          </a:p>
+          <a:p>
+            <a:pPr>
+              <a:lnSpc>
+                <a:spcPct val="100000"/>
+              </a:lnSpc>
+              <a:spcBef>
+                <a:spcPts val="600"/>
+              </a:spcBef>
+              <a:spcAft>
+                <a:spcPts val="1200"/>
+              </a:spcAft>
+            </a:pPr>
+            <a:r>
+              <a:rPr lang="en-GB" i="1" dirty="0"/>
+              <a:t>Introduction to </a:t>
+            </a:r>
+            <a:r>
+              <a:rPr lang="en-GB" i="1" dirty="0" err="1"/>
+              <a:t>data.table</a:t>
+            </a:r>
+            <a:r>
+              <a:rPr lang="en-GB" dirty="0"/>
+              <a:t>. (2018). </a:t>
+            </a:r>
+            <a:r>
+              <a:rPr lang="en-GB" dirty="0">
+                <a:hlinkClick r:id="rId2"/>
+              </a:rPr>
+              <a:t>https://cran.r-project.org/web/packages/data.table/vignettes/datatable-intro.html</a:t>
+            </a:r>
+            <a:r>
+              <a:rPr lang="en-GB" dirty="0"/>
+              <a:t> </a:t>
+            </a:r>
+          </a:p>
         </p:txBody>
       </p:sp>
       <p:sp>
@@ -9887,7 +9936,7 @@
           <p:nvPr/>
         </p:nvPicPr>
         <p:blipFill>
-          <a:blip r:embed="rId2">
+          <a:blip r:embed="rId3">
             <a:extLst>
               <a:ext uri="{28A0092B-C50C-407E-A947-70E740481C1C}">
                 <a14:useLocalDpi xmlns:a14="http://schemas.microsoft.com/office/drawing/2010/main" val="0"/>
@@ -9934,7 +9983,7 @@
           <p:nvPr/>
         </p:nvPicPr>
         <p:blipFill>
-          <a:blip r:embed="rId3">
+          <a:blip r:embed="rId4">
             <a:extLst>
               <a:ext uri="{28A0092B-C50C-407E-A947-70E740481C1C}">
                 <a14:useLocalDpi xmlns:a14="http://schemas.microsoft.com/office/drawing/2010/main" val="0"/>
@@ -9964,6 +10013,36 @@
               </a14:hiddenFill>
             </a:ext>
           </a:extLst>
+        </p:spPr>
+      </p:pic>
+      <p:pic>
+        <p:nvPicPr>
+          <p:cNvPr id="3" name="Picture 2">
+            <a:extLst>
+              <a:ext uri="{FF2B5EF4-FFF2-40B4-BE49-F238E27FC236}">
+                <a16:creationId xmlns:a16="http://schemas.microsoft.com/office/drawing/2014/main" id="{0E0C5BF6-32B3-4149-9483-8887852F273D}"/>
+              </a:ext>
+            </a:extLst>
+          </p:cNvPr>
+          <p:cNvPicPr>
+            <a:picLocks noChangeAspect="1"/>
+          </p:cNvPicPr>
+          <p:nvPr/>
+        </p:nvPicPr>
+        <p:blipFill>
+          <a:blip r:embed="rId5"/>
+          <a:stretch>
+            <a:fillRect/>
+          </a:stretch>
+        </p:blipFill>
+        <p:spPr>
+          <a:xfrm>
+            <a:off x="315911" y="4200900"/>
+            <a:ext cx="720000" cy="663415"/>
+          </a:xfrm>
+          <a:prstGeom prst="rect">
+            <a:avLst/>
+          </a:prstGeom>
         </p:spPr>
       </p:pic>
     </p:spTree>

</xml_diff>